<commit_message>
added MVC and Validation
</commit_message>
<xml_diff>
--- a/Razor/lecture.pptx
+++ b/Razor/lecture.pptx
@@ -297,7 +297,7 @@
             <a:pPr algn="r">
               <a:buNone/>
             </a:pPr>
-            <a:fld id="{CE712884-884B-45F0-A71B-C3388F0C2DE2}" type="slidenum">
+            <a:fld id="{EEA7AC55-7AA7-44CD-AB20-072898FFC3AC}" type="slidenum">
               <a:rPr b="0" lang="en-CA" sz="1400" spc="-1" strike="noStrike">
                 <a:latin typeface="Times New Roman"/>
               </a:rPr>
@@ -345,7 +345,7 @@
         <p:spPr>
           <a:xfrm>
             <a:off x="3884760" y="8685360"/>
-            <a:ext cx="2970360" cy="455760"/>
+            <a:ext cx="2970000" cy="455400"/>
           </a:xfrm>
           <a:prstGeom prst="rect">
             <a:avLst/>
@@ -378,7 +378,7 @@
               </a:lnSpc>
               <a:buNone/>
             </a:pPr>
-            <a:fld id="{1C74C5CB-2396-4076-8453-0F4A05F252D8}" type="slidenum">
+            <a:fld id="{53CE166B-21AB-44D2-9DED-A6A08E32ED1C}" type="slidenum">
               <a:rPr b="0" lang="en-US" sz="1200" spc="-1" strike="noStrike">
                 <a:latin typeface="Times New Roman"/>
                 <a:ea typeface="Lucida Sans Unicode"/>
@@ -404,7 +404,7 @@
         <p:spPr>
           <a:xfrm>
             <a:off x="1143000" y="685800"/>
-            <a:ext cx="4570560" cy="3427560"/>
+            <a:ext cx="4570200" cy="3427200"/>
           </a:xfrm>
           <a:prstGeom prst="rect">
             <a:avLst/>
@@ -427,7 +427,7 @@
         <p:spPr>
           <a:xfrm>
             <a:off x="685800" y="4343400"/>
-            <a:ext cx="5484960" cy="4113360"/>
+            <a:ext cx="5484600" cy="4113000"/>
           </a:xfrm>
           <a:prstGeom prst="rect">
             <a:avLst/>
@@ -3538,7 +3538,7 @@
         <p:spPr>
           <a:xfrm>
             <a:off x="34920" y="6099120"/>
-            <a:ext cx="2532240" cy="712800"/>
+            <a:ext cx="2531880" cy="712440"/>
           </a:xfrm>
           <a:prstGeom prst="rect">
             <a:avLst/>
@@ -3831,7 +3831,7 @@
         <p:spPr>
           <a:xfrm>
             <a:off x="34920" y="6099120"/>
-            <a:ext cx="2532240" cy="712800"/>
+            <a:ext cx="2531880" cy="712440"/>
           </a:xfrm>
           <a:prstGeom prst="rect">
             <a:avLst/>
@@ -4117,7 +4117,7 @@
         <p:spPr>
           <a:xfrm>
             <a:off x="685800" y="2130480"/>
-            <a:ext cx="7770960" cy="1468440"/>
+            <a:ext cx="7770600" cy="1468080"/>
           </a:xfrm>
           <a:prstGeom prst="rect">
             <a:avLst/>
@@ -4194,7 +4194,7 @@
         <p:spPr>
           <a:xfrm>
             <a:off x="457200" y="274680"/>
-            <a:ext cx="8228160" cy="1141560"/>
+            <a:ext cx="8227800" cy="1141200"/>
           </a:xfrm>
           <a:prstGeom prst="rect">
             <a:avLst/>
@@ -4244,7 +4244,7 @@
         <p:spPr>
           <a:xfrm>
             <a:off x="1441080" y="1416240"/>
-            <a:ext cx="7018920" cy="4524480"/>
+            <a:ext cx="7018560" cy="4524120"/>
           </a:xfrm>
           <a:prstGeom prst="rect">
             <a:avLst/>
@@ -4393,7 +4393,7 @@
         <p:spPr>
           <a:xfrm>
             <a:off x="457200" y="274680"/>
-            <a:ext cx="8228160" cy="1141560"/>
+            <a:ext cx="8227800" cy="1141200"/>
           </a:xfrm>
           <a:prstGeom prst="rect">
             <a:avLst/>
@@ -4433,60 +4433,90 @@
       <p:sp>
         <p:nvSpPr>
           <p:cNvPr id="88" name=""/>
-          <p:cNvSpPr txBox="1"/>
+          <p:cNvSpPr/>
           <p:nvPr/>
         </p:nvSpPr>
         <p:spPr>
           <a:xfrm>
             <a:off x="1111680" y="1413720"/>
-            <a:ext cx="6268320" cy="2726280"/>
-          </a:xfrm>
-          <a:prstGeom prst="rect">
-            <a:avLst/>
-          </a:prstGeom>
-          <a:noFill/>
-          <a:ln w="0">
-            <a:noFill/>
-          </a:ln>
-        </p:spPr>
+            <a:ext cx="6267960" cy="2725920"/>
+          </a:xfrm>
+          <a:prstGeom prst="rect">
+            <a:avLst/>
+          </a:prstGeom>
+          <a:noFill/>
+          <a:ln w="0">
+            <a:noFill/>
+          </a:ln>
+        </p:spPr>
+        <p:style>
+          <a:lnRef idx="0"/>
+          <a:fillRef idx="0"/>
+          <a:effectRef idx="0"/>
+          <a:fontRef idx="minor"/>
+        </p:style>
         <p:txBody>
           <a:bodyPr lIns="90000" rIns="90000" tIns="45000" bIns="45000" anchor="t">
             <a:noAutofit/>
           </a:bodyPr>
           <a:p>
+            <a:pPr>
+              <a:lnSpc>
+                <a:spcPct val="100000"/>
+              </a:lnSpc>
+              <a:buNone/>
+            </a:pPr>
             <a:r>
               <a:rPr b="1" lang="en-CA" sz="1800" spc="-1" strike="noStrike">
                 <a:latin typeface="FreeMono"/>
               </a:rPr>
               <a:t>@page</a:t>
             </a:r>
-            <a:endParaRPr b="1" lang="en-CA" sz="1800" spc="-1" strike="noStrike">
-              <a:latin typeface="FreeMono"/>
-            </a:endParaRPr>
-          </a:p>
-          <a:p>
+            <a:endParaRPr b="0" lang="en-CA" sz="1800" spc="-1" strike="noStrike">
+              <a:latin typeface="Arial"/>
+            </a:endParaRPr>
+          </a:p>
+          <a:p>
+            <a:pPr>
+              <a:lnSpc>
+                <a:spcPct val="100000"/>
+              </a:lnSpc>
+              <a:buNone/>
+            </a:pPr>
             <a:r>
               <a:rPr b="1" lang="en-CA" sz="1800" spc="-1" strike="noStrike">
                 <a:latin typeface="FreeMono"/>
               </a:rPr>
               <a:t>@model Razor01.Pages.CounterModel</a:t>
             </a:r>
-            <a:endParaRPr b="1" lang="en-CA" sz="1800" spc="-1" strike="noStrike">
-              <a:latin typeface="FreeMono"/>
-            </a:endParaRPr>
-          </a:p>
-          <a:p>
+            <a:endParaRPr b="0" lang="en-CA" sz="1800" spc="-1" strike="noStrike">
+              <a:latin typeface="Arial"/>
+            </a:endParaRPr>
+          </a:p>
+          <a:p>
+            <a:pPr>
+              <a:lnSpc>
+                <a:spcPct val="100000"/>
+              </a:lnSpc>
+              <a:buNone/>
+            </a:pPr>
             <a:r>
               <a:rPr b="1" lang="en-CA" sz="1800" spc="-1" strike="noStrike">
                 <a:latin typeface="FreeMono"/>
               </a:rPr>
               <a:t>@{</a:t>
             </a:r>
-            <a:endParaRPr b="1" lang="en-CA" sz="1800" spc="-1" strike="noStrike">
-              <a:latin typeface="FreeMono"/>
-            </a:endParaRPr>
-          </a:p>
-          <a:p>
+            <a:endParaRPr b="0" lang="en-CA" sz="1800" spc="-1" strike="noStrike">
+              <a:latin typeface="Arial"/>
+            </a:endParaRPr>
+          </a:p>
+          <a:p>
+            <a:pPr>
+              <a:lnSpc>
+                <a:spcPct val="100000"/>
+              </a:lnSpc>
+              <a:buNone/>
+            </a:pPr>
             <a:r>
               <a:rPr b="1" lang="en-CA" sz="1800" spc="-1" strike="noStrike">
                 <a:latin typeface="FreeMono"/>
@@ -4499,55 +4529,85 @@
               </a:rPr>
               <a:t>ViewData["Title"] = "Counter";</a:t>
             </a:r>
-            <a:endParaRPr b="1" lang="en-CA" sz="1800" spc="-1" strike="noStrike">
-              <a:latin typeface="FreeMono"/>
-            </a:endParaRPr>
-          </a:p>
-          <a:p>
+            <a:endParaRPr b="0" lang="en-CA" sz="1800" spc="-1" strike="noStrike">
+              <a:latin typeface="Arial"/>
+            </a:endParaRPr>
+          </a:p>
+          <a:p>
+            <a:pPr>
+              <a:lnSpc>
+                <a:spcPct val="100000"/>
+              </a:lnSpc>
+              <a:buNone/>
+            </a:pPr>
             <a:r>
               <a:rPr b="1" lang="en-CA" sz="1800" spc="-1" strike="noStrike">
                 <a:latin typeface="FreeMono"/>
               </a:rPr>
               <a:t>}</a:t>
             </a:r>
-            <a:endParaRPr b="1" lang="en-CA" sz="1800" spc="-1" strike="noStrike">
-              <a:latin typeface="FreeMono"/>
-            </a:endParaRPr>
-          </a:p>
-          <a:p>
+            <a:endParaRPr b="0" lang="en-CA" sz="1800" spc="-1" strike="noStrike">
+              <a:latin typeface="Arial"/>
+            </a:endParaRPr>
+          </a:p>
+          <a:p>
+            <a:pPr>
+              <a:lnSpc>
+                <a:spcPct val="100000"/>
+              </a:lnSpc>
+              <a:buNone/>
+            </a:pPr>
             <a:r>
               <a:rPr b="1" lang="en-CA" sz="1800" spc="-1" strike="noStrike">
                 <a:latin typeface="FreeMono"/>
               </a:rPr>
               <a:t>&lt;h2&gt;Count to 10&lt;/h2&gt;</a:t>
             </a:r>
-            <a:endParaRPr b="1" lang="en-CA" sz="1800" spc="-1" strike="noStrike">
-              <a:latin typeface="FreeMono"/>
-            </a:endParaRPr>
-          </a:p>
-          <a:p>
+            <a:endParaRPr b="0" lang="en-CA" sz="1800" spc="-1" strike="noStrike">
+              <a:latin typeface="Arial"/>
+            </a:endParaRPr>
+          </a:p>
+          <a:p>
+            <a:pPr>
+              <a:lnSpc>
+                <a:spcPct val="100000"/>
+              </a:lnSpc>
+              <a:buNone/>
+            </a:pPr>
             <a:r>
               <a:rPr b="1" lang="en-CA" sz="1800" spc="-1" strike="noStrike">
                 <a:latin typeface="FreeMono"/>
               </a:rPr>
               <a:t>@for(int i = 0; i &lt; 10; i++)</a:t>
             </a:r>
-            <a:endParaRPr b="1" lang="en-CA" sz="1800" spc="-1" strike="noStrike">
-              <a:latin typeface="FreeMono"/>
-            </a:endParaRPr>
-          </a:p>
-          <a:p>
+            <a:endParaRPr b="0" lang="en-CA" sz="1800" spc="-1" strike="noStrike">
+              <a:latin typeface="Arial"/>
+            </a:endParaRPr>
+          </a:p>
+          <a:p>
+            <a:pPr>
+              <a:lnSpc>
+                <a:spcPct val="100000"/>
+              </a:lnSpc>
+              <a:buNone/>
+            </a:pPr>
             <a:r>
               <a:rPr b="1" lang="en-CA" sz="1800" spc="-1" strike="noStrike">
                 <a:latin typeface="FreeMono"/>
               </a:rPr>
               <a:t>{</a:t>
             </a:r>
-            <a:endParaRPr b="1" lang="en-CA" sz="1800" spc="-1" strike="noStrike">
-              <a:latin typeface="FreeMono"/>
-            </a:endParaRPr>
-          </a:p>
-          <a:p>
+            <a:endParaRPr b="0" lang="en-CA" sz="1800" spc="-1" strike="noStrike">
+              <a:latin typeface="Arial"/>
+            </a:endParaRPr>
+          </a:p>
+          <a:p>
+            <a:pPr>
+              <a:lnSpc>
+                <a:spcPct val="100000"/>
+              </a:lnSpc>
+              <a:buNone/>
+            </a:pPr>
             <a:r>
               <a:rPr b="1" lang="en-CA" sz="1800" spc="-1" strike="noStrike">
                 <a:latin typeface="FreeMono"/>
@@ -4560,11 +4620,17 @@
               </a:rPr>
               <a:t>@i</a:t>
             </a:r>
-            <a:endParaRPr b="1" lang="en-CA" sz="1800" spc="-1" strike="noStrike">
-              <a:latin typeface="FreeMono"/>
-            </a:endParaRPr>
-          </a:p>
-          <a:p>
+            <a:endParaRPr b="0" lang="en-CA" sz="1800" spc="-1" strike="noStrike">
+              <a:latin typeface="Arial"/>
+            </a:endParaRPr>
+          </a:p>
+          <a:p>
+            <a:pPr>
+              <a:lnSpc>
+                <a:spcPct val="100000"/>
+              </a:lnSpc>
+              <a:buNone/>
+            </a:pPr>
             <a:r>
               <a:rPr b="1" lang="en-CA" sz="1800" spc="-1" strike="noStrike">
                 <a:latin typeface="FreeMono"/>
@@ -4577,19 +4643,25 @@
               </a:rPr>
               <a:t>&lt;br /&gt;</a:t>
             </a:r>
-            <a:endParaRPr b="1" lang="en-CA" sz="1800" spc="-1" strike="noStrike">
-              <a:latin typeface="FreeMono"/>
-            </a:endParaRPr>
-          </a:p>
-          <a:p>
+            <a:endParaRPr b="0" lang="en-CA" sz="1800" spc="-1" strike="noStrike">
+              <a:latin typeface="Arial"/>
+            </a:endParaRPr>
+          </a:p>
+          <a:p>
+            <a:pPr>
+              <a:lnSpc>
+                <a:spcPct val="100000"/>
+              </a:lnSpc>
+              <a:buNone/>
+            </a:pPr>
             <a:r>
               <a:rPr b="1" lang="en-CA" sz="1800" spc="-1" strike="noStrike">
                 <a:latin typeface="FreeMono"/>
               </a:rPr>
               <a:t>}</a:t>
             </a:r>
-            <a:endParaRPr b="1" lang="en-CA" sz="1800" spc="-1" strike="noStrike">
-              <a:latin typeface="FreeMono"/>
+            <a:endParaRPr b="0" lang="en-CA" sz="1800" spc="-1" strike="noStrike">
+              <a:latin typeface="Arial"/>
             </a:endParaRPr>
           </a:p>
         </p:txBody>
@@ -4637,7 +4709,7 @@
         <p:spPr>
           <a:xfrm>
             <a:off x="457200" y="274680"/>
-            <a:ext cx="8228160" cy="1141560"/>
+            <a:ext cx="8227800" cy="1141200"/>
           </a:xfrm>
           <a:prstGeom prst="rect">
             <a:avLst/>
@@ -4687,7 +4759,7 @@
         <p:spPr>
           <a:xfrm>
             <a:off x="1441080" y="1416240"/>
-            <a:ext cx="7018920" cy="4524480"/>
+            <a:ext cx="7018560" cy="4524120"/>
           </a:xfrm>
           <a:prstGeom prst="rect">
             <a:avLst/>
@@ -4856,7 +4928,7 @@
         <p:spPr>
           <a:xfrm>
             <a:off x="159840" y="180000"/>
-            <a:ext cx="8228160" cy="1141560"/>
+            <a:ext cx="8227800" cy="1141200"/>
           </a:xfrm>
           <a:prstGeom prst="rect">
             <a:avLst/>
@@ -4896,22 +4968,28 @@
       <p:sp>
         <p:nvSpPr>
           <p:cNvPr id="92" name="PlaceHolder 8"/>
-          <p:cNvSpPr txBox="1"/>
+          <p:cNvSpPr/>
           <p:nvPr/>
         </p:nvSpPr>
         <p:spPr>
           <a:xfrm>
             <a:off x="504000" y="1116000"/>
-            <a:ext cx="8228160" cy="4464000"/>
-          </a:xfrm>
-          <a:prstGeom prst="rect">
-            <a:avLst/>
-          </a:prstGeom>
-          <a:noFill/>
-          <a:ln w="0">
-            <a:noFill/>
-          </a:ln>
-        </p:spPr>
+            <a:ext cx="8227800" cy="4463640"/>
+          </a:xfrm>
+          <a:prstGeom prst="rect">
+            <a:avLst/>
+          </a:prstGeom>
+          <a:noFill/>
+          <a:ln w="0">
+            <a:noFill/>
+          </a:ln>
+        </p:spPr>
+        <p:style>
+          <a:lnRef idx="0"/>
+          <a:fillRef idx="0"/>
+          <a:effectRef idx="0"/>
+          <a:fontRef idx="minor"/>
+        </p:style>
         <p:txBody>
           <a:bodyPr lIns="90000" rIns="90000" tIns="45000" bIns="45000" anchor="t">
             <a:noAutofit/>
@@ -4952,16 +5030,6 @@
             <a:br>
               <a:rPr sz="2100"/>
             </a:br>
-            <a:r>
-              <a:rPr b="0" lang="en-CA" sz="2100" spc="-1" strike="noStrike">
-                <a:solidFill>
-                  <a:srgbClr val="535353"/>
-                </a:solidFill>
-                <a:latin typeface="Calibri"/>
-                <a:ea typeface="ＭＳ Ｐゴシック"/>
-              </a:rPr>
-              <a:t>	</a:t>
-            </a:r>
             <a:r>
               <a:rPr b="0" lang="en-CA" sz="2100" spc="-1" strike="noStrike">
                 <a:solidFill>
@@ -5028,7 +5096,7 @@
               <a:t>OnGet() and OnPost() methods are called by the runtime before the Razor page is rendered. </a:t>
             </a:r>
             <a:br>
-              <a:rPr sz="2400"/>
+              <a:rPr sz="2100"/>
             </a:br>
             <a:endParaRPr b="0" lang="en-CA" sz="2100" spc="-1" strike="noStrike">
               <a:latin typeface="Arial"/>

</xml_diff>